<commit_message>
Update Presentation du projet SFL2  (Julio) Revue 2.pptx
</commit_message>
<xml_diff>
--- a/Revue n2/Presentation du projet SFL2  (Julio) Revue 2.pptx
+++ b/Revue n2/Presentation du projet SFL2  (Julio) Revue 2.pptx
@@ -20,7 +20,6 @@
     <p:sldId id="266" r:id="rId19"/>
     <p:sldId id="261" r:id="rId20"/>
     <p:sldId id="274" r:id="rId21"/>
-    <p:sldId id="273" r:id="rId22"/>
   </p:sldIdLst>
   <p:sldSz cx="12192000" cy="6858000"/>
   <p:notesSz cx="6858000" cy="9144000"/>
@@ -222,7 +221,7 @@
           <a:effectLst/>
           <a:extLst>
             <a:ext uri="{91240B29-F687-4f45-9708-019B960494DF}">
-              <a14:hiddenLine xmlns:a14="http://schemas.microsoft.com/office/drawing/2010/main" xmlns="" w="9525">
+              <a14:hiddenLine xmlns="" xmlns:a14="http://schemas.microsoft.com/office/drawing/2010/main" w="9525">
                 <a:solidFill>
                   <a:srgbClr val="000000"/>
                 </a:solidFill>
@@ -415,7 +414,7 @@
             <a:fld id="{08B9EBBA-996F-894A-B54A-D6246ED52CEA}" type="datetimeFigureOut">
               <a:rPr lang="en-US" dirty="0"/>
               <a:pPr/>
-              <a:t>2/8/2019</a:t>
+              <a:t>6/6/2019</a:t>
             </a:fld>
             <a:endParaRPr lang="en-US" dirty="0"/>
           </a:p>
@@ -730,7 +729,7 @@
             <a:fld id="{18C79C5D-2A6F-F04D-97DA-BEF2467B64E4}" type="datetimeFigureOut">
               <a:rPr lang="en-US" dirty="0"/>
               <a:pPr/>
-              <a:t>2/8/2019</a:t>
+              <a:t>6/6/2019</a:t>
             </a:fld>
             <a:endParaRPr lang="en-US" dirty="0"/>
           </a:p>
@@ -1215,7 +1214,7 @@
             <a:fld id="{8DFA1846-DA80-1C48-A609-854EA85C59AD}" type="datetimeFigureOut">
               <a:rPr lang="en-US" dirty="0"/>
               <a:pPr/>
-              <a:t>2/8/2019</a:t>
+              <a:t>6/6/2019</a:t>
             </a:fld>
             <a:endParaRPr lang="en-US" dirty="0"/>
           </a:p>
@@ -1581,7 +1580,7 @@
             <a:fld id="{FBF54567-0DE4-3F47-BF90-CB84690072F9}" type="datetimeFigureOut">
               <a:rPr lang="en-US" dirty="0"/>
               <a:pPr/>
-              <a:t>2/8/2019</a:t>
+              <a:t>6/6/2019</a:t>
             </a:fld>
             <a:endParaRPr lang="en-US" dirty="0"/>
           </a:p>
@@ -1732,7 +1731,7 @@
           <a:ln/>
           <a:extLst>
             <a:ext uri="{91240B29-F687-4f45-9708-019B960494DF}">
-              <a14:hiddenLine xmlns:a14="http://schemas.microsoft.com/office/drawing/2010/main" xmlns="" w="9525">
+              <a14:hiddenLine xmlns="" xmlns:a14="http://schemas.microsoft.com/office/drawing/2010/main" w="9525">
                 <a:solidFill>
                   <a:srgbClr val="000000"/>
                 </a:solidFill>
@@ -1851,7 +1850,7 @@
             <a:fld id="{C6C52C72-DE31-F449-A4ED-4C594FD91407}" type="datetimeFigureOut">
               <a:rPr lang="en-US" dirty="0"/>
               <a:pPr/>
-              <a:t>2/8/2019</a:t>
+              <a:t>6/6/2019</a:t>
             </a:fld>
             <a:endParaRPr lang="en-US" dirty="0"/>
           </a:p>
@@ -2004,7 +2003,7 @@
           <a:ln/>
           <a:extLst>
             <a:ext uri="{91240B29-F687-4f45-9708-019B960494DF}">
-              <a14:hiddenLine xmlns:a14="http://schemas.microsoft.com/office/drawing/2010/main" xmlns="" w="9525">
+              <a14:hiddenLine xmlns="" xmlns:a14="http://schemas.microsoft.com/office/drawing/2010/main" w="9525">
                 <a:solidFill>
                   <a:srgbClr val="000000"/>
                 </a:solidFill>
@@ -2133,7 +2132,7 @@
             <a:fld id="{ED62726E-379B-B349-9EED-81ED093FA806}" type="datetimeFigureOut">
               <a:rPr lang="en-US" dirty="0"/>
               <a:pPr/>
-              <a:t>2/8/2019</a:t>
+              <a:t>6/6/2019</a:t>
             </a:fld>
             <a:endParaRPr lang="en-US" dirty="0"/>
           </a:p>
@@ -2284,7 +2283,7 @@
           <a:ln/>
           <a:extLst>
             <a:ext uri="{91240B29-F687-4f45-9708-019B960494DF}">
-              <a14:hiddenLine xmlns:a14="http://schemas.microsoft.com/office/drawing/2010/main" xmlns="" w="9525">
+              <a14:hiddenLine xmlns="" xmlns:a14="http://schemas.microsoft.com/office/drawing/2010/main" w="9525">
                 <a:solidFill>
                   <a:srgbClr val="000000"/>
                 </a:solidFill>
@@ -2413,7 +2412,7 @@
             <a:fld id="{9B3A1323-8D79-1946-B0D7-40001CF92E9D}" type="datetimeFigureOut">
               <a:rPr lang="en-US" dirty="0"/>
               <a:pPr/>
-              <a:t>2/8/2019</a:t>
+              <a:t>6/6/2019</a:t>
             </a:fld>
             <a:endParaRPr lang="en-US" dirty="0"/>
           </a:p>
@@ -2753,7 +2752,7 @@
             <a:fld id="{8DFA1846-DA80-1C48-A609-854EA85C59AD}" type="datetimeFigureOut">
               <a:rPr lang="en-US" dirty="0"/>
               <a:pPr/>
-              <a:t>2/8/2019</a:t>
+              <a:t>6/6/2019</a:t>
             </a:fld>
             <a:endParaRPr lang="en-US" dirty="0"/>
           </a:p>
@@ -2904,7 +2903,7 @@
           <a:ln/>
           <a:extLst>
             <a:ext uri="{91240B29-F687-4f45-9708-019B960494DF}">
-              <a14:hiddenLine xmlns:a14="http://schemas.microsoft.com/office/drawing/2010/main" xmlns="" w="9525">
+              <a14:hiddenLine xmlns="" xmlns:a14="http://schemas.microsoft.com/office/drawing/2010/main" w="9525">
                 <a:solidFill>
                   <a:srgbClr val="000000"/>
                 </a:solidFill>
@@ -3089,7 +3088,7 @@
             <a:fld id="{57302355-E14B-8545-A8F8-0FE83CC9D524}" type="datetimeFigureOut">
               <a:rPr lang="en-US" dirty="0"/>
               <a:pPr/>
-              <a:t>2/8/2019</a:t>
+              <a:t>6/6/2019</a:t>
             </a:fld>
             <a:endParaRPr lang="en-US" dirty="0"/>
           </a:p>
@@ -3240,7 +3239,7 @@
           <a:ln/>
           <a:extLst>
             <a:ext uri="{91240B29-F687-4f45-9708-019B960494DF}">
-              <a14:hiddenLine xmlns:a14="http://schemas.microsoft.com/office/drawing/2010/main" xmlns="" w="9525">
+              <a14:hiddenLine xmlns="" xmlns:a14="http://schemas.microsoft.com/office/drawing/2010/main" w="9525">
                 <a:solidFill>
                   <a:srgbClr val="000000"/>
                 </a:solidFill>
@@ -3563,7 +3562,7 @@
             <a:fld id="{02640F58-564D-2B4F-AE67-E407BA4FCF45}" type="datetimeFigureOut">
               <a:rPr lang="en-US" dirty="0"/>
               <a:pPr/>
-              <a:t>2/8/2019</a:t>
+              <a:t>6/6/2019</a:t>
             </a:fld>
             <a:endParaRPr lang="en-US" dirty="0"/>
           </a:p>
@@ -3714,7 +3713,7 @@
           <a:ln/>
           <a:extLst>
             <a:ext uri="{91240B29-F687-4f45-9708-019B960494DF}">
-              <a14:hiddenLine xmlns:a14="http://schemas.microsoft.com/office/drawing/2010/main" xmlns="" w="9525">
+              <a14:hiddenLine xmlns="" xmlns:a14="http://schemas.microsoft.com/office/drawing/2010/main" w="9525">
                 <a:solidFill>
                   <a:srgbClr val="000000"/>
                 </a:solidFill>
@@ -3781,7 +3780,7 @@
             <a:fld id="{F13A34C8-038E-2045-AF43-DF7DBB8E0E9E}" type="datetimeFigureOut">
               <a:rPr lang="en-US" dirty="0"/>
               <a:pPr/>
-              <a:t>2/8/2019</a:t>
+              <a:t>6/6/2019</a:t>
             </a:fld>
             <a:endParaRPr lang="en-US" dirty="0"/>
           </a:p>
@@ -3873,7 +3872,7 @@
             <a:fld id="{8818C68F-D26B-8F47-958C-23B49CF8A634}" type="datetimeFigureOut">
               <a:rPr lang="en-US" dirty="0"/>
               <a:pPr/>
-              <a:t>2/8/2019</a:t>
+              <a:t>6/6/2019</a:t>
             </a:fld>
             <a:endParaRPr lang="en-US" dirty="0"/>
           </a:p>
@@ -4137,7 +4136,7 @@
           <a:ln/>
           <a:extLst>
             <a:ext uri="{91240B29-F687-4f45-9708-019B960494DF}">
-              <a14:hiddenLine xmlns:a14="http://schemas.microsoft.com/office/drawing/2010/main" xmlns="" w="9525">
+              <a14:hiddenLine xmlns="" xmlns:a14="http://schemas.microsoft.com/office/drawing/2010/main" w="9525">
                 <a:solidFill>
                   <a:srgbClr val="000000"/>
                 </a:solidFill>
@@ -4337,7 +4336,7 @@
             <a:fld id="{D0DF5E60-9974-AC48-9591-99C2BB44B7CF}" type="datetimeFigureOut">
               <a:rPr lang="en-US" dirty="0"/>
               <a:pPr/>
-              <a:t>2/8/2019</a:t>
+              <a:t>6/6/2019</a:t>
             </a:fld>
             <a:endParaRPr lang="en-US" dirty="0"/>
           </a:p>
@@ -4647,7 +4646,7 @@
             <a:fld id="{18C79C5D-2A6F-F04D-97DA-BEF2467B64E4}" type="datetimeFigureOut">
               <a:rPr lang="en-US" dirty="0"/>
               <a:pPr/>
-              <a:t>2/8/2019</a:t>
+              <a:t>6/6/2019</a:t>
             </a:fld>
             <a:endParaRPr lang="en-US" dirty="0"/>
           </a:p>
@@ -4914,7 +4913,7 @@
             <a:fld id="{09B482E8-6E0E-1B4F-B1FD-C69DB9E858D9}" type="datetimeFigureOut">
               <a:rPr lang="en-US" dirty="0"/>
               <a:pPr/>
-              <a:t>2/8/2019</a:t>
+              <a:t>6/6/2019</a:t>
             </a:fld>
             <a:endParaRPr lang="en-US" dirty="0"/>
           </a:p>
@@ -5567,7 +5566,7 @@
           </a:ln>
           <a:extLst>
             <a:ext uri="{91240B29-F687-4f45-9708-019B960494DF}">
-              <a14:hiddenLine xmlns="" xmlns:a16="http://schemas.microsoft.com/office/drawing/2014/main" xmlns:p14="http://schemas.microsoft.com/office/powerpoint/2010/main" xmlns:a14="http://schemas.microsoft.com/office/drawing/2010/main" w="9525">
+              <a14:hiddenLine xmlns:a14="http://schemas.microsoft.com/office/drawing/2010/main" xmlns:p14="http://schemas.microsoft.com/office/powerpoint/2010/main" xmlns:a16="http://schemas.microsoft.com/office/drawing/2014/main" xmlns="" w="9525">
                 <a:solidFill>
                   <a:srgbClr val="000000"/>
                 </a:solidFill>
@@ -5864,7 +5863,7 @@
           </a:ln>
           <a:extLst>
             <a:ext uri="{91240B29-F687-4f45-9708-019B960494DF}">
-              <a14:hiddenLine xmlns="" xmlns:a16="http://schemas.microsoft.com/office/drawing/2014/main" xmlns:p14="http://schemas.microsoft.com/office/powerpoint/2010/main" xmlns:a14="http://schemas.microsoft.com/office/drawing/2010/main" w="9525">
+              <a14:hiddenLine xmlns:a14="http://schemas.microsoft.com/office/drawing/2010/main" xmlns:p14="http://schemas.microsoft.com/office/powerpoint/2010/main" xmlns:a16="http://schemas.microsoft.com/office/drawing/2014/main" xmlns="" w="9525">
                 <a:solidFill>
                   <a:srgbClr val="000000"/>
                 </a:solidFill>
@@ -6158,7 +6157,7 @@
           </a:ln>
           <a:extLst>
             <a:ext uri="{91240B29-F687-4f45-9708-019B960494DF}">
-              <a14:hiddenLine xmlns="" xmlns:a16="http://schemas.microsoft.com/office/drawing/2014/main" xmlns:p14="http://schemas.microsoft.com/office/powerpoint/2010/main" xmlns:a14="http://schemas.microsoft.com/office/drawing/2010/main" w="9525">
+              <a14:hiddenLine xmlns:a14="http://schemas.microsoft.com/office/drawing/2010/main" xmlns:p14="http://schemas.microsoft.com/office/powerpoint/2010/main" xmlns:a16="http://schemas.microsoft.com/office/drawing/2014/main" xmlns="" w="9525">
                 <a:solidFill>
                   <a:srgbClr val="000000"/>
                 </a:solidFill>
@@ -6452,7 +6451,7 @@
           </a:ln>
           <a:extLst>
             <a:ext uri="{91240B29-F687-4f45-9708-019B960494DF}">
-              <a14:hiddenLine xmlns="" xmlns:a16="http://schemas.microsoft.com/office/drawing/2014/main" xmlns:p14="http://schemas.microsoft.com/office/powerpoint/2010/main" xmlns:a14="http://schemas.microsoft.com/office/drawing/2010/main" w="9525">
+              <a14:hiddenLine xmlns:a14="http://schemas.microsoft.com/office/drawing/2010/main" xmlns:p14="http://schemas.microsoft.com/office/powerpoint/2010/main" xmlns:a16="http://schemas.microsoft.com/office/drawing/2014/main" xmlns="" w="9525">
                 <a:solidFill>
                   <a:srgbClr val="000000"/>
                 </a:solidFill>
@@ -7080,7 +7079,7 @@
           <a:effectLst/>
           <a:extLst>
             <a:ext uri="{91240B29-F687-4f45-9708-019B960494DF}">
-              <a14:hiddenLine xmlns:a14="http://schemas.microsoft.com/office/drawing/2010/main" xmlns:p14="http://schemas.microsoft.com/office/powerpoint/2010/main" xmlns:a16="http://schemas.microsoft.com/office/drawing/2014/main" xmlns="" w="9525">
+              <a14:hiddenLine xmlns="" xmlns:a16="http://schemas.microsoft.com/office/drawing/2014/main" xmlns:p14="http://schemas.microsoft.com/office/powerpoint/2010/main" xmlns:a14="http://schemas.microsoft.com/office/drawing/2010/main" w="9525">
                 <a:solidFill>
                   <a:srgbClr val="000000"/>
                 </a:solidFill>
@@ -7460,66 +7459,6 @@
 </p:sld>
 </file>
 
-<file path=ppt/slides/slide16.xml><?xml version="1.0" encoding="utf-8"?>
-<p:sld xmlns:a="http://schemas.openxmlformats.org/drawingml/2006/main" xmlns:r="http://schemas.openxmlformats.org/officeDocument/2006/relationships" xmlns:p="http://schemas.openxmlformats.org/presentationml/2006/main">
-  <p:cSld>
-    <p:spTree>
-      <p:nvGrpSpPr>
-        <p:cNvPr id="1" name=""/>
-        <p:cNvGrpSpPr/>
-        <p:nvPr/>
-      </p:nvGrpSpPr>
-      <p:grpSpPr>
-        <a:xfrm>
-          <a:off x="0" y="0"/>
-          <a:ext cx="0" cy="0"/>
-          <a:chOff x="0" y="0"/>
-          <a:chExt cx="0" cy="0"/>
-        </a:xfrm>
-      </p:grpSpPr>
-      <p:pic>
-        <p:nvPicPr>
-          <p:cNvPr id="22" name="Image 21" descr="Une image contenant texte&#10;&#10;Description générée automatiquement">
-            <a:extLst>
-              <a:ext uri="{FF2B5EF4-FFF2-40B4-BE49-F238E27FC236}">
-                <a16:creationId xmlns:a16="http://schemas.microsoft.com/office/drawing/2014/main" id="{E833AE2C-5826-4390-8365-4FB46B318D5A}"/>
-              </a:ext>
-            </a:extLst>
-          </p:cNvPr>
-          <p:cNvPicPr>
-            <a:picLocks noChangeAspect="1"/>
-          </p:cNvPicPr>
-          <p:nvPr/>
-        </p:nvPicPr>
-        <p:blipFill>
-          <a:blip r:embed="rId2"/>
-          <a:stretch>
-            <a:fillRect/>
-          </a:stretch>
-        </p:blipFill>
-        <p:spPr>
-          <a:xfrm>
-            <a:off x="0" y="0"/>
-            <a:ext cx="12192000" cy="6858000"/>
-          </a:xfrm>
-          <a:prstGeom prst="rect">
-            <a:avLst/>
-          </a:prstGeom>
-        </p:spPr>
-      </p:pic>
-    </p:spTree>
-    <p:extLst>
-      <p:ext uri="{BB962C8B-B14F-4D97-AF65-F5344CB8AC3E}">
-        <p14:creationId xmlns:p14="http://schemas.microsoft.com/office/powerpoint/2010/main" val="1373478023"/>
-      </p:ext>
-    </p:extLst>
-  </p:cSld>
-  <p:clrMapOvr>
-    <a:masterClrMapping/>
-  </p:clrMapOvr>
-</p:sld>
-</file>
-
 <file path=ppt/slides/slide2.xml><?xml version="1.0" encoding="utf-8"?>
 <p:sld xmlns:a="http://schemas.openxmlformats.org/drawingml/2006/main" xmlns:r="http://schemas.openxmlformats.org/officeDocument/2006/relationships" xmlns:p="http://schemas.openxmlformats.org/presentationml/2006/main">
   <p:cSld>
@@ -8071,7 +8010,7 @@
           </a:ln>
           <a:extLst>
             <a:ext uri="{91240B29-F687-4f45-9708-019B960494DF}">
-              <a14:hiddenLine xmlns="" xmlns:a16="http://schemas.microsoft.com/office/drawing/2014/main" xmlns:p14="http://schemas.microsoft.com/office/powerpoint/2010/main" xmlns:a14="http://schemas.microsoft.com/office/drawing/2010/main" w="9525">
+              <a14:hiddenLine xmlns:a14="http://schemas.microsoft.com/office/drawing/2010/main" xmlns:p14="http://schemas.microsoft.com/office/powerpoint/2010/main" xmlns:a16="http://schemas.microsoft.com/office/drawing/2014/main" xmlns="" w="9525">
                 <a:solidFill>
                   <a:srgbClr val="000000"/>
                 </a:solidFill>
@@ -8411,7 +8350,7 @@
           <a:effectLst/>
           <a:extLst>
             <a:ext uri="{91240B29-F687-4f45-9708-019B960494DF}">
-              <a14:hiddenLine xmlns:a14="http://schemas.microsoft.com/office/drawing/2010/main" xmlns:p14="http://schemas.microsoft.com/office/powerpoint/2010/main" xmlns:a16="http://schemas.microsoft.com/office/drawing/2014/main" xmlns="" w="9525">
+              <a14:hiddenLine xmlns="" xmlns:a16="http://schemas.microsoft.com/office/drawing/2014/main" xmlns:p14="http://schemas.microsoft.com/office/powerpoint/2010/main" xmlns:a14="http://schemas.microsoft.com/office/drawing/2010/main" w="9525">
                 <a:solidFill>
                   <a:srgbClr val="000000"/>
                 </a:solidFill>
@@ -8998,7 +8937,7 @@
           <a:effectLst/>
           <a:extLst>
             <a:ext uri="{91240B29-F687-4f45-9708-019B960494DF}">
-              <a14:hiddenLine xmlns:a14="http://schemas.microsoft.com/office/drawing/2010/main" xmlns:p14="http://schemas.microsoft.com/office/powerpoint/2010/main" xmlns:a16="http://schemas.microsoft.com/office/drawing/2014/main" xmlns="" w="9525">
+              <a14:hiddenLine xmlns="" xmlns:a16="http://schemas.microsoft.com/office/drawing/2014/main" xmlns:p14="http://schemas.microsoft.com/office/powerpoint/2010/main" xmlns:a14="http://schemas.microsoft.com/office/drawing/2010/main" w="9525">
                 <a:solidFill>
                   <a:srgbClr val="000000"/>
                 </a:solidFill>
@@ -9555,7 +9494,7 @@
           <a:effectLst/>
           <a:extLst>
             <a:ext uri="{91240B29-F687-4f45-9708-019B960494DF}">
-              <a14:hiddenLine xmlns:a14="http://schemas.microsoft.com/office/drawing/2010/main" xmlns:p14="http://schemas.microsoft.com/office/powerpoint/2010/main" xmlns:a16="http://schemas.microsoft.com/office/drawing/2014/main" xmlns="" w="9525">
+              <a14:hiddenLine xmlns="" xmlns:a16="http://schemas.microsoft.com/office/drawing/2014/main" xmlns:p14="http://schemas.microsoft.com/office/powerpoint/2010/main" xmlns:a14="http://schemas.microsoft.com/office/drawing/2010/main" w="9525">
                 <a:solidFill>
                   <a:srgbClr val="000000"/>
                 </a:solidFill>
@@ -10303,7 +10242,7 @@
           </a:ln>
           <a:extLst>
             <a:ext uri="{91240B29-F687-4f45-9708-019B960494DF}">
-              <a14:hiddenLine xmlns="" xmlns:a16="http://schemas.microsoft.com/office/drawing/2014/main" xmlns:p14="http://schemas.microsoft.com/office/powerpoint/2010/main" xmlns:a14="http://schemas.microsoft.com/office/drawing/2010/main" w="9525">
+              <a14:hiddenLine xmlns:a14="http://schemas.microsoft.com/office/drawing/2010/main" xmlns:p14="http://schemas.microsoft.com/office/powerpoint/2010/main" xmlns:a16="http://schemas.microsoft.com/office/drawing/2014/main" xmlns="" w="9525">
                 <a:solidFill>
                   <a:srgbClr val="000000"/>
                 </a:solidFill>
@@ -10652,7 +10591,7 @@
           </a:ln>
           <a:extLst>
             <a:ext uri="{91240B29-F687-4f45-9708-019B960494DF}">
-              <a14:hiddenLine xmlns:a14="http://schemas.microsoft.com/office/drawing/2010/main" xmlns:p14="http://schemas.microsoft.com/office/powerpoint/2010/main" xmlns:a16="http://schemas.microsoft.com/office/drawing/2014/main" xmlns="" w="9525">
+              <a14:hiddenLine xmlns="" xmlns:a16="http://schemas.microsoft.com/office/drawing/2014/main" xmlns:p14="http://schemas.microsoft.com/office/powerpoint/2010/main" xmlns:a14="http://schemas.microsoft.com/office/drawing/2010/main" w="9525">
                 <a:solidFill>
                   <a:srgbClr val="000000"/>
                 </a:solidFill>
@@ -11110,19 +11049,19 @@
 
 <file path=customXml/item1.xml><?xml version="1.0" encoding="utf-8"?>
 <Control xmlns="http://schemas.microsoft.com/VisualStudio/2011/storyboarding/control">
-  <Id Name="System.Storyboarding.Common.Text" Revision="1" Stencil="System.Storyboarding.Common" StencilVersion="0.1"/>
+  <Id Name="System.Storyboarding.WindowsApps.Share" Revision="1" Stencil="System.Storyboarding.WindowsApps" StencilVersion="0.1"/>
 </Control>
 </file>
 
 <file path=customXml/item2.xml><?xml version="1.0" encoding="utf-8"?>
 <Control xmlns="http://schemas.microsoft.com/VisualStudio/2011/storyboarding/control">
-  <Id Name="System.Storyboarding.WindowsApps.Share" Revision="1" Stencil="System.Storyboarding.WindowsApps" StencilVersion="0.1"/>
+  <Id Name="System.Storyboarding.Common.Text" Revision="1" Stencil="System.Storyboarding.Common" StencilVersion="0.1"/>
 </Control>
 </file>
 
 <file path=customXml/item3.xml><?xml version="1.0" encoding="utf-8"?>
 <Control xmlns="http://schemas.microsoft.com/VisualStudio/2011/storyboarding/control">
-  <Id Name="System.Storyboarding.WindowsApps.AppBar" Revision="1" Stencil="System.Storyboarding.WindowsApps" StencilVersion="0.1"/>
+  <Id Name="System.Storyboarding.Icons.ShoppingCart" Revision="1" Stencil="System.Storyboarding.Icons" StencilVersion="0.1"/>
 </Control>
 </file>
 
@@ -11134,11 +11073,19 @@
 
 <file path=customXml/item5.xml><?xml version="1.0" encoding="utf-8"?>
 <Control xmlns="http://schemas.microsoft.com/VisualStudio/2011/storyboarding/control">
-  <Id Name="System.Storyboarding.Icons.ShoppingCart" Revision="1" Stencil="System.Storyboarding.Icons" StencilVersion="0.1"/>
+  <Id Name="System.Storyboarding.WindowsApps.AppBar" Revision="1" Stencil="System.Storyboarding.WindowsApps" StencilVersion="0.1"/>
 </Control>
 </file>
 
 <file path=customXml/itemProps1.xml><?xml version="1.0" encoding="utf-8"?>
+<ds:datastoreItem xmlns:ds="http://schemas.openxmlformats.org/officeDocument/2006/customXml" ds:itemID="{91097976-5E66-41D8-ACC8-873151AB4E26}">
+  <ds:schemaRefs>
+    <ds:schemaRef ds:uri="http://schemas.microsoft.com/VisualStudio/2011/storyboarding/control"/>
+  </ds:schemaRefs>
+</ds:datastoreItem>
+</file>
+
+<file path=customXml/itemProps2.xml><?xml version="1.0" encoding="utf-8"?>
 <ds:datastoreItem xmlns:ds="http://schemas.openxmlformats.org/officeDocument/2006/customXml" ds:itemID="{A7EB2591-C851-4B19-B1F0-F52DEFA579ED}">
   <ds:schemaRefs>
     <ds:schemaRef ds:uri="http://schemas.microsoft.com/VisualStudio/2011/storyboarding/control"/>
@@ -11146,16 +11093,8 @@
 </ds:datastoreItem>
 </file>
 
-<file path=customXml/itemProps2.xml><?xml version="1.0" encoding="utf-8"?>
-<ds:datastoreItem xmlns:ds="http://schemas.openxmlformats.org/officeDocument/2006/customXml" ds:itemID="{91097976-5E66-41D8-ACC8-873151AB4E26}">
-  <ds:schemaRefs>
-    <ds:schemaRef ds:uri="http://schemas.microsoft.com/VisualStudio/2011/storyboarding/control"/>
-  </ds:schemaRefs>
-</ds:datastoreItem>
-</file>
-
 <file path=customXml/itemProps3.xml><?xml version="1.0" encoding="utf-8"?>
-<ds:datastoreItem xmlns:ds="http://schemas.openxmlformats.org/officeDocument/2006/customXml" ds:itemID="{35FB3D4A-92F3-4C3B-8298-A606444F704C}">
+<ds:datastoreItem xmlns:ds="http://schemas.openxmlformats.org/officeDocument/2006/customXml" ds:itemID="{B008DC4A-68C3-419C-8751-C37CC4556442}">
   <ds:schemaRefs>
     <ds:schemaRef ds:uri="http://schemas.microsoft.com/VisualStudio/2011/storyboarding/control"/>
   </ds:schemaRefs>
@@ -11171,7 +11110,7 @@
 </file>
 
 <file path=customXml/itemProps5.xml><?xml version="1.0" encoding="utf-8"?>
-<ds:datastoreItem xmlns:ds="http://schemas.openxmlformats.org/officeDocument/2006/customXml" ds:itemID="{B008DC4A-68C3-419C-8751-C37CC4556442}">
+<ds:datastoreItem xmlns:ds="http://schemas.openxmlformats.org/officeDocument/2006/customXml" ds:itemID="{35FB3D4A-92F3-4C3B-8298-A606444F704C}">
   <ds:schemaRefs>
     <ds:schemaRef ds:uri="http://schemas.microsoft.com/VisualStudio/2011/storyboarding/control"/>
   </ds:schemaRefs>

</xml_diff>